<commit_message>
Prepared for first reading :)
</commit_message>
<xml_diff>
--- a/L1 Database Introduction.pptx
+++ b/L1 Database Introduction.pptx
@@ -645,11 +645,7 @@
             </a:r>
             <a:r>
               <a:rPr lang="en-US" baseline="0" dirty="0" smtClean="0"/>
-              <a:t> of distinct and </a:t>
-            </a:r>
-            <a:r>
-              <a:rPr lang="en-US" baseline="0" smtClean="0"/>
-              <a:t>(partially) order</a:t>
+              <a:t> of distinct and (partially) order</a:t>
             </a:r>
             <a:endParaRPr lang="en-US" dirty="0"/>
           </a:p>
@@ -844,6 +840,90 @@
           <a:p>
             <a:fld id="{C7FF5C99-9852-4B46-B102-0710872716CD}" type="slidenum">
               <a:rPr lang="en-US" smtClean="0"/>
+              <a:t>14</a:t>
+            </a:fld>
+            <a:endParaRPr lang="en-US"/>
+          </a:p>
+        </p:txBody>
+      </p:sp>
+    </p:spTree>
+    <p:extLst>
+      <p:ext uri="{BB962C8B-B14F-4D97-AF65-F5344CB8AC3E}">
+        <p14:creationId xmlns:p14="http://schemas.microsoft.com/office/powerpoint/2010/main" val="1265806"/>
+      </p:ext>
+    </p:extLst>
+  </p:cSld>
+  <p:clrMapOvr>
+    <a:masterClrMapping/>
+  </p:clrMapOvr>
+</p:notes>
+</file>
+
+<file path=ppt/notesSlides/notesSlide13.xml><?xml version="1.0" encoding="utf-8"?>
+<p:notes xmlns:a="http://schemas.openxmlformats.org/drawingml/2006/main" xmlns:r="http://schemas.openxmlformats.org/officeDocument/2006/relationships" xmlns:p="http://schemas.openxmlformats.org/presentationml/2006/main">
+  <p:cSld>
+    <p:spTree>
+      <p:nvGrpSpPr>
+        <p:cNvPr id="1" name=""/>
+        <p:cNvGrpSpPr/>
+        <p:nvPr/>
+      </p:nvGrpSpPr>
+      <p:grpSpPr>
+        <a:xfrm>
+          <a:off x="0" y="0"/>
+          <a:ext cx="0" cy="0"/>
+          <a:chOff x="0" y="0"/>
+          <a:chExt cx="0" cy="0"/>
+        </a:xfrm>
+      </p:grpSpPr>
+      <p:sp>
+        <p:nvSpPr>
+          <p:cNvPr id="2" name="Slide Image Placeholder 1"/>
+          <p:cNvSpPr>
+            <a:spLocks noGrp="1" noRot="1" noChangeAspect="1"/>
+          </p:cNvSpPr>
+          <p:nvPr>
+            <p:ph type="sldImg"/>
+          </p:nvPr>
+        </p:nvSpPr>
+        <p:spPr/>
+      </p:sp>
+      <p:sp>
+        <p:nvSpPr>
+          <p:cNvPr id="3" name="Notes Placeholder 2"/>
+          <p:cNvSpPr>
+            <a:spLocks noGrp="1"/>
+          </p:cNvSpPr>
+          <p:nvPr>
+            <p:ph type="body" idx="1"/>
+          </p:nvPr>
+        </p:nvSpPr>
+        <p:spPr/>
+        <p:txBody>
+          <a:bodyPr/>
+          <a:lstStyle/>
+          <a:p>
+            <a:endParaRPr lang="en-US" dirty="0"/>
+          </a:p>
+        </p:txBody>
+      </p:sp>
+      <p:sp>
+        <p:nvSpPr>
+          <p:cNvPr id="4" name="Slide Number Placeholder 3"/>
+          <p:cNvSpPr>
+            <a:spLocks noGrp="1"/>
+          </p:cNvSpPr>
+          <p:nvPr>
+            <p:ph type="sldNum" sz="quarter" idx="10"/>
+          </p:nvPr>
+        </p:nvSpPr>
+        <p:spPr/>
+        <p:txBody>
+          <a:bodyPr/>
+          <a:lstStyle/>
+          <a:p>
+            <a:fld id="{C7FF5C99-9852-4B46-B102-0710872716CD}" type="slidenum">
+              <a:rPr lang="en-US" smtClean="0"/>
               <a:t>17</a:t>
             </a:fld>
             <a:endParaRPr lang="en-US"/>
@@ -1228,11 +1308,7 @@
             </a:r>
             <a:r>
               <a:rPr lang="en-US" baseline="0" dirty="0" smtClean="0"/>
-              <a:t> </a:t>
-            </a:r>
-            <a:r>
-              <a:rPr lang="en-US" baseline="0" dirty="0" smtClean="0"/>
-              <a:t>is another Linux oriented database</a:t>
+              <a:t> is another Linux oriented database</a:t>
             </a:r>
           </a:p>
           <a:p>
@@ -4834,11 +4910,7 @@
           <a:p>
             <a:r>
               <a:rPr lang="en-US" dirty="0" smtClean="0"/>
-              <a:t>for </a:t>
-            </a:r>
-            <a:r>
-              <a:rPr lang="en-US" dirty="0" smtClean="0"/>
-              <a:t>students</a:t>
+              <a:t>for students</a:t>
             </a:r>
             <a:endParaRPr lang="en-US" dirty="0"/>
           </a:p>
@@ -5013,22 +5085,55 @@
         <p:spPr/>
         <p:txBody>
           <a:bodyPr>
-            <a:normAutofit fontScale="92500" lnSpcReduction="10000"/>
+            <a:normAutofit fontScale="70000" lnSpcReduction="20000"/>
           </a:bodyPr>
           <a:lstStyle/>
           <a:p>
             <a:r>
               <a:rPr lang="en-US" dirty="0" smtClean="0"/>
-              <a:t>select * from TBL</a:t>
-            </a:r>
-          </a:p>
-          <a:p>
+              <a:t>select * from </a:t>
+            </a:r>
+            <a:r>
+              <a:rPr lang="en-US" dirty="0"/>
+              <a:t>employees</a:t>
+            </a:r>
             <a:endParaRPr lang="en-US" dirty="0" smtClean="0"/>
           </a:p>
           <a:p>
-            <a:r>
-              <a:rPr lang="en-US" dirty="0" smtClean="0"/>
-              <a:t>select ID, NAME from TBL</a:t>
+            <a:endParaRPr lang="en-US" dirty="0" smtClean="0"/>
+          </a:p>
+          <a:p>
+            <a:r>
+              <a:rPr lang="en-US" dirty="0"/>
+              <a:t>select </a:t>
+            </a:r>
+            <a:r>
+              <a:rPr lang="en-US" dirty="0" err="1"/>
+              <a:t>employee_id</a:t>
+            </a:r>
+            <a:r>
+              <a:rPr lang="en-US" dirty="0"/>
+              <a:t>, </a:t>
+            </a:r>
+            <a:r>
+              <a:rPr lang="en-US" dirty="0" err="1"/>
+              <a:t>first_name</a:t>
+            </a:r>
+            <a:r>
+              <a:rPr lang="en-US" dirty="0"/>
+              <a:t>||' '||</a:t>
+            </a:r>
+            <a:r>
+              <a:rPr lang="en-US" dirty="0" err="1"/>
+              <a:t>last_name</a:t>
+            </a:r>
+            <a:r>
+              <a:rPr lang="en-US" dirty="0"/>
+              <a:t> from employees</a:t>
+            </a:r>
+            <a:r>
+              <a:rPr lang="en-US" dirty="0" smtClean="0"/>
+              <a:t/>
             </a:r>
             <a:br>
               <a:rPr lang="en-US" dirty="0" smtClean="0"/>
@@ -5038,36 +5143,91 @@
           <a:p>
             <a:r>
               <a:rPr lang="en-US" dirty="0"/>
+              <a:t>select distinct salary from employees</a:t>
+            </a:r>
+            <a:endParaRPr lang="en-US" dirty="0"/>
+          </a:p>
+          <a:p>
+            <a:endParaRPr lang="en-US" dirty="0" smtClean="0"/>
+          </a:p>
+          <a:p>
+            <a:r>
+              <a:rPr lang="en-US" dirty="0"/>
+              <a:t>select distinct salary from employees where </a:t>
+            </a:r>
+            <a:r>
+              <a:rPr lang="en-US" dirty="0" err="1" smtClean="0"/>
+              <a:t>department_id</a:t>
+            </a:r>
+            <a:r>
+              <a:rPr lang="en-US" dirty="0" smtClean="0"/>
+              <a:t>=80</a:t>
+            </a:r>
+          </a:p>
+          <a:p>
+            <a:endParaRPr lang="en-US" dirty="0" smtClean="0"/>
+          </a:p>
+          <a:p>
+            <a:r>
+              <a:rPr lang="en-US" dirty="0"/>
               <a:t>select </a:t>
             </a:r>
             <a:r>
               <a:rPr lang="en-US" dirty="0" smtClean="0"/>
-              <a:t>distinct ID</a:t>
+              <a:t>* </a:t>
             </a:r>
             <a:r>
               <a:rPr lang="en-US" dirty="0"/>
-              <a:t>, NAME from TBL</a:t>
-            </a:r>
-          </a:p>
-          <a:p>
+              <a:t>from </a:t>
+            </a:r>
+            <a:r>
+              <a:rPr lang="en-US" dirty="0" smtClean="0"/>
+              <a:t>employees order by </a:t>
+            </a:r>
+            <a:r>
+              <a:rPr lang="en-US" dirty="0" err="1" smtClean="0"/>
+              <a:t>first_name</a:t>
+            </a:r>
             <a:endParaRPr lang="en-US" dirty="0" smtClean="0"/>
           </a:p>
           <a:p>
-            <a:r>
-              <a:rPr lang="en-US" dirty="0" smtClean="0"/>
-              <a:t>select NAME from TBL where ID=1</a:t>
-            </a:r>
-          </a:p>
-          <a:p>
             <a:endParaRPr lang="en-US" dirty="0" smtClean="0"/>
           </a:p>
           <a:p>
             <a:r>
               <a:rPr lang="en-US" dirty="0" smtClean="0"/>
-              <a:t>select NAME from TBL order by NAME</a:t>
-            </a:r>
-          </a:p>
-          <a:p>
+              <a:t>select </a:t>
+            </a:r>
+            <a:r>
+              <a:rPr lang="en-US" dirty="0" err="1" smtClean="0"/>
+              <a:t>first_name</a:t>
+            </a:r>
+            <a:r>
+              <a:rPr lang="en-US" dirty="0" smtClean="0"/>
+              <a:t>, salary*12 as </a:t>
+            </a:r>
+            <a:r>
+              <a:rPr lang="en-US" dirty="0" err="1" smtClean="0"/>
+              <a:t>sal_year</a:t>
+            </a:r>
+            <a:r>
+              <a:rPr lang="en-US" dirty="0" smtClean="0"/>
+              <a:t> from employees</a:t>
+            </a:r>
+            <a:endParaRPr lang="en-US" dirty="0" smtClean="0"/>
+          </a:p>
+          <a:p>
+            <a:endParaRPr lang="en-US" dirty="0" smtClean="0"/>
+          </a:p>
+          <a:p>
+            <a:r>
+              <a:rPr lang="en-US" dirty="0" smtClean="0"/>
+              <a:t>select 2+3 </a:t>
+            </a:r>
+            <a:r>
+              <a:rPr lang="en-US" dirty="0"/>
+              <a:t>as sum from dual</a:t>
+            </a:r>
             <a:endParaRPr lang="en-US" dirty="0" smtClean="0"/>
           </a:p>
         </p:txBody>
@@ -5138,7 +5298,7 @@
         <p:spPr/>
         <p:txBody>
           <a:bodyPr>
-            <a:normAutofit fontScale="85000" lnSpcReduction="20000"/>
+            <a:normAutofit fontScale="77500" lnSpcReduction="20000"/>
           </a:bodyPr>
           <a:lstStyle/>
           <a:p>
@@ -5150,21 +5310,132 @@
               <a:rPr lang="en-US" dirty="0" smtClean="0"/>
             </a:br>
             <a:r>
-              <a:rPr lang="en-US" sz="2200" dirty="0" smtClean="0"/>
-              <a:t>where ID=1</a:t>
-            </a:r>
-          </a:p>
-          <a:p>
-            <a:r>
-              <a:rPr lang="en-US" dirty="0" smtClean="0"/>
-              <a:t>Logical conditions (not, and, or)</a:t>
+              <a:rPr lang="en-US" sz="2000" dirty="0"/>
+              <a:t>select * from employees where salary &gt; 10000</a:t>
+            </a:r>
+          </a:p>
+          <a:p>
+            <a:r>
+              <a:rPr lang="en-US" dirty="0" smtClean="0"/>
+              <a:t>Logical </a:t>
+            </a:r>
+            <a:r>
+              <a:rPr lang="en-US" dirty="0" smtClean="0"/>
+              <a:t>conditions (not, and, or)</a:t>
             </a:r>
             <a:br>
               <a:rPr lang="en-US" dirty="0" smtClean="0"/>
             </a:br>
             <a:r>
-              <a:rPr lang="en-US" sz="2200" dirty="0" smtClean="0"/>
-              <a:t>where ID=1 or ID=2</a:t>
+              <a:rPr lang="en-US" sz="2000" dirty="0"/>
+              <a:t>select * from employees where salary &gt; 10000 and </a:t>
+            </a:r>
+            <a:r>
+              <a:rPr lang="en-US" sz="2000" dirty="0" err="1"/>
+              <a:t>department_id</a:t>
+            </a:r>
+            <a:r>
+              <a:rPr lang="en-US" sz="2000" dirty="0"/>
+              <a:t>=80</a:t>
+            </a:r>
+          </a:p>
+          <a:p>
+            <a:r>
+              <a:rPr lang="en-US" dirty="0" smtClean="0"/>
+              <a:t>Is </a:t>
+            </a:r>
+            <a:r>
+              <a:rPr lang="en-US" dirty="0" smtClean="0"/>
+              <a:t>null</a:t>
+            </a:r>
+            <a:br>
+              <a:rPr lang="en-US" dirty="0" smtClean="0"/>
+            </a:br>
+            <a:r>
+              <a:rPr lang="en-US" sz="2000" dirty="0"/>
+              <a:t>select * from employees where </a:t>
+            </a:r>
+            <a:r>
+              <a:rPr lang="en-US" sz="2000" dirty="0" err="1"/>
+              <a:t>manager_id</a:t>
+            </a:r>
+            <a:r>
+              <a:rPr lang="en-US" sz="2000" dirty="0"/>
+              <a:t> is null</a:t>
+            </a:r>
+          </a:p>
+          <a:p>
+            <a:r>
+              <a:rPr lang="en-US" dirty="0" smtClean="0"/>
+              <a:t>Like</a:t>
+            </a:r>
+            <a:r>
+              <a:rPr lang="en-US" dirty="0"/>
+              <a:t/>
+            </a:r>
+            <a:br>
+              <a:rPr lang="en-US" dirty="0"/>
+            </a:br>
+            <a:r>
+              <a:rPr lang="en-US" sz="2000" dirty="0"/>
+              <a:t>select * from employees where </a:t>
+            </a:r>
+            <a:r>
+              <a:rPr lang="en-US" sz="2000" dirty="0" err="1"/>
+              <a:t>first_name</a:t>
+            </a:r>
+            <a:r>
+              <a:rPr lang="en-US" sz="2000" dirty="0"/>
+              <a:t> like '%</a:t>
+            </a:r>
+            <a:r>
+              <a:rPr lang="en-US" sz="2000" dirty="0" err="1"/>
+              <a:t>nn</a:t>
+            </a:r>
+            <a:r>
+              <a:rPr lang="en-US" sz="2000" dirty="0"/>
+              <a:t>%'</a:t>
+            </a:r>
+          </a:p>
+          <a:p>
+            <a:r>
+              <a:rPr lang="en-US" dirty="0" smtClean="0"/>
+              <a:t>IN</a:t>
+            </a:r>
+            <a:r>
+              <a:rPr lang="en-US" dirty="0" smtClean="0"/>
+              <a:t/>
+            </a:r>
+            <a:br>
+              <a:rPr lang="en-US" dirty="0" smtClean="0"/>
+            </a:br>
+            <a:r>
+              <a:rPr lang="en-US" sz="2000" dirty="0"/>
+              <a:t>select * from employees where salary in (6000, 10000) and </a:t>
+            </a:r>
+            <a:r>
+              <a:rPr lang="en-US" sz="2000" dirty="0" err="1"/>
+              <a:t>employee_id</a:t>
+            </a:r>
+            <a:r>
+              <a:rPr lang="en-US" sz="2000" dirty="0"/>
+              <a:t> not in (select </a:t>
+            </a:r>
+            <a:r>
+              <a:rPr lang="en-US" sz="2000" dirty="0" err="1"/>
+              <a:t>employee_id</a:t>
+            </a:r>
+            <a:r>
+              <a:rPr lang="en-US" sz="2000" dirty="0"/>
+              <a:t> from </a:t>
+            </a:r>
+            <a:r>
+              <a:rPr lang="en-US" sz="2000" dirty="0" err="1"/>
+              <a:t>job_history</a:t>
+            </a:r>
+            <a:r>
+              <a:rPr lang="en-US" sz="2000" dirty="0"/>
+              <a:t>)</a:t>
             </a:r>
           </a:p>
           <a:p>
@@ -5172,63 +5443,81 @@
               <a:rPr lang="en-US" dirty="0" smtClean="0"/>
               <a:t>Exists</a:t>
             </a:r>
+            <a:r>
+              <a:rPr lang="en-US" dirty="0"/>
+              <a:t/>
+            </a:r>
             <a:br>
-              <a:rPr lang="en-US" dirty="0" smtClean="0"/>
+              <a:rPr lang="en-US" dirty="0"/>
             </a:br>
             <a:r>
-              <a:rPr lang="en-US" sz="2200" dirty="0" smtClean="0"/>
-              <a:t>where exists (select ID from TBL2 where TBL.ID=TBL2.ID)</a:t>
-            </a:r>
-          </a:p>
-          <a:p>
-            <a:r>
-              <a:rPr lang="en-US" dirty="0" smtClean="0"/>
-              <a:t>Is null</a:t>
+              <a:rPr lang="en-US" sz="2000" dirty="0"/>
+              <a:t>select * from employees e where exists (select </a:t>
+            </a:r>
+            <a:r>
+              <a:rPr lang="en-US" sz="2000" dirty="0" err="1"/>
+              <a:t>employee_id</a:t>
+            </a:r>
+            <a:r>
+              <a:rPr lang="en-US" sz="2000" dirty="0"/>
+              <a:t> from </a:t>
+            </a:r>
+            <a:r>
+              <a:rPr lang="en-US" sz="2000" dirty="0" err="1"/>
+              <a:t>job_history</a:t>
+            </a:r>
+            <a:r>
+              <a:rPr lang="en-US" sz="2000" dirty="0"/>
+              <a:t> </a:t>
+            </a:r>
+            <a:r>
+              <a:rPr lang="en-US" sz="2000" dirty="0" err="1"/>
+              <a:t>jh</a:t>
+            </a:r>
+            <a:r>
+              <a:rPr lang="en-US" sz="2000" dirty="0"/>
+              <a:t> where </a:t>
+            </a:r>
+            <a:r>
+              <a:rPr lang="en-US" sz="2000" dirty="0" err="1"/>
+              <a:t>jh.employee_id</a:t>
+            </a:r>
+            <a:r>
+              <a:rPr lang="en-US" sz="2000" dirty="0"/>
+              <a:t>=</a:t>
+            </a:r>
+            <a:r>
+              <a:rPr lang="en-US" sz="2000" dirty="0" err="1"/>
+              <a:t>e.employee_id</a:t>
+            </a:r>
+            <a:r>
+              <a:rPr lang="en-US" sz="2000" dirty="0"/>
+              <a:t>)</a:t>
+            </a:r>
+          </a:p>
+          <a:p>
+            <a:r>
+              <a:rPr lang="en-US" dirty="0" smtClean="0"/>
+              <a:t>All / any</a:t>
+            </a:r>
+            <a:r>
+              <a:rPr lang="en-US" sz="2900" dirty="0" smtClean="0"/>
+              <a:t/>
             </a:r>
             <a:br>
-              <a:rPr lang="en-US" dirty="0" smtClean="0"/>
+              <a:rPr lang="en-US" sz="2900" dirty="0" smtClean="0"/>
             </a:br>
             <a:r>
-              <a:rPr lang="en-US" sz="2200" dirty="0"/>
-              <a:t>where </a:t>
-            </a:r>
-            <a:r>
-              <a:rPr lang="en-US" sz="2200" dirty="0" smtClean="0"/>
-              <a:t>NAME is null</a:t>
-            </a:r>
-          </a:p>
-          <a:p>
-            <a:r>
-              <a:rPr lang="en-US" dirty="0" smtClean="0"/>
-              <a:t>IN</a:t>
-            </a:r>
-            <a:br>
-              <a:rPr lang="en-US" dirty="0" smtClean="0"/>
-            </a:br>
-            <a:r>
-              <a:rPr lang="en-US" sz="2200" dirty="0" smtClean="0"/>
-              <a:t>where ID in (select ID from TBL2)</a:t>
-            </a:r>
-            <a:br>
-              <a:rPr lang="en-US" sz="2200" dirty="0" smtClean="0"/>
-            </a:br>
-            <a:r>
-              <a:rPr lang="en-US" sz="2200" dirty="0" smtClean="0"/>
-              <a:t>where ID in (1, 2)</a:t>
-            </a:r>
-          </a:p>
-          <a:p>
-            <a:r>
-              <a:rPr lang="en-US" dirty="0" smtClean="0"/>
-              <a:t>Like</a:t>
-            </a:r>
-            <a:br>
-              <a:rPr lang="en-US" dirty="0" smtClean="0"/>
-            </a:br>
-            <a:r>
-              <a:rPr lang="en-US" sz="2400" dirty="0" smtClean="0"/>
-              <a:t>where NAME like ‘AL%’</a:t>
-            </a:r>
+              <a:rPr lang="en-US" sz="2000" dirty="0" smtClean="0"/>
+              <a:t>select </a:t>
+            </a:r>
+            <a:r>
+              <a:rPr lang="en-US" sz="2000" dirty="0"/>
+              <a:t>* from employees where salary &gt;= all (select salary from employees)</a:t>
+            </a:r>
+          </a:p>
+          <a:p>
+            <a:endParaRPr lang="en-US" sz="2400" dirty="0" smtClean="0"/>
           </a:p>
         </p:txBody>
       </p:sp>
@@ -5306,17 +5595,17 @@
           <a:p>
             <a:r>
               <a:rPr lang="en-US" sz="5000" dirty="0" smtClean="0"/>
-              <a:t>Inner Join</a:t>
-            </a:r>
-            <a:r>
-              <a:rPr lang="en-US" sz="4500" dirty="0"/>
-              <a:t/>
-            </a:r>
-            <a:br>
-              <a:rPr lang="en-US" sz="4500" dirty="0"/>
-            </a:br>
-            <a:r>
-              <a:rPr lang="en-US" dirty="0"/>
+              <a:t>Inner </a:t>
+            </a:r>
+            <a:r>
+              <a:rPr lang="en-US" sz="5000" dirty="0" smtClean="0"/>
+              <a:t>Join</a:t>
+            </a:r>
+            <a:endParaRPr lang="en-US" sz="4500" dirty="0"/>
+          </a:p>
+          <a:p>
+            <a:r>
+              <a:rPr lang="en-US" dirty="0" smtClean="0"/>
               <a:t>select </a:t>
             </a:r>
             <a:r>
@@ -5336,11 +5625,11 @@
               <a:t> </a:t>
             </a:r>
             <a:r>
-              <a:rPr lang="en-US" dirty="0" err="1" smtClean="0"/>
+              <a:rPr lang="en-US" dirty="0" err="1"/>
               <a:t>emp</a:t>
             </a:r>
             <a:r>
-              <a:rPr lang="en-US" dirty="0" smtClean="0"/>
+              <a:rPr lang="en-US" dirty="0"/>
               <a:t>, </a:t>
             </a:r>
             <a:r>
@@ -5357,33 +5646,213 @@
             </a:r>
             <a:r>
               <a:rPr lang="en-US" dirty="0"/>
+              <a:t> man</a:t>
+            </a:r>
+          </a:p>
+          <a:p>
+            <a:r>
+              <a:rPr lang="en-US" dirty="0"/>
+              <a:t>from employees e</a:t>
+            </a:r>
+          </a:p>
+          <a:p>
+            <a:r>
+              <a:rPr lang="en-US" dirty="0"/>
+              <a:t>join employees m on </a:t>
+            </a:r>
+            <a:r>
+              <a:rPr lang="en-US" dirty="0" err="1"/>
+              <a:t>m.employee_id</a:t>
+            </a:r>
+            <a:r>
+              <a:rPr lang="en-US" dirty="0"/>
+              <a:t>=</a:t>
+            </a:r>
+            <a:r>
+              <a:rPr lang="en-US" dirty="0" err="1"/>
+              <a:t>e.manager_id</a:t>
+            </a:r>
+            <a:endParaRPr lang="en-US" dirty="0"/>
+          </a:p>
+          <a:p>
+            <a:endParaRPr lang="en-US" dirty="0" smtClean="0"/>
+          </a:p>
+          <a:p>
+            <a:r>
+              <a:rPr lang="en-US" sz="5000" dirty="0"/>
+              <a:t>l</a:t>
+            </a:r>
+            <a:r>
+              <a:rPr lang="en-US" sz="5000" dirty="0" smtClean="0"/>
+              <a:t>eft </a:t>
+            </a:r>
+            <a:r>
+              <a:rPr lang="en-US" sz="5000" dirty="0" smtClean="0"/>
+              <a:t>join</a:t>
+            </a:r>
+          </a:p>
+          <a:p>
+            <a:r>
+              <a:rPr lang="en-US" dirty="0" smtClean="0"/>
+              <a:t>select </a:t>
+            </a:r>
+            <a:r>
+              <a:rPr lang="en-US" dirty="0" err="1"/>
+              <a:t>e.first_name</a:t>
+            </a:r>
+            <a:r>
+              <a:rPr lang="en-US" dirty="0"/>
+              <a:t>||' '||</a:t>
+            </a:r>
+            <a:r>
+              <a:rPr lang="en-US" dirty="0" err="1"/>
+              <a:t>e.last_name</a:t>
+            </a:r>
+            <a:r>
+              <a:rPr lang="en-US" dirty="0"/>
               <a:t> </a:t>
             </a:r>
             <a:r>
-              <a:rPr lang="en-US" dirty="0" smtClean="0"/>
-              <a:t>man</a:t>
-            </a:r>
-            <a:br>
-              <a:rPr lang="en-US" dirty="0" smtClean="0"/>
-            </a:br>
-            <a:r>
-              <a:rPr lang="en-US" dirty="0" smtClean="0"/>
-              <a:t>from employees e </a:t>
-            </a:r>
-            <a:br>
-              <a:rPr lang="en-US" dirty="0" smtClean="0"/>
-            </a:br>
-            <a:r>
-              <a:rPr lang="en-US" b="1" dirty="0" smtClean="0"/>
-              <a:t>join </a:t>
+              <a:rPr lang="en-US" dirty="0" err="1"/>
+              <a:t>emp</a:t>
             </a:r>
             <a:r>
               <a:rPr lang="en-US" dirty="0"/>
-              <a:t>employees m on </a:t>
+              <a:t>, </a:t>
+            </a:r>
+            <a:r>
+              <a:rPr lang="en-US" dirty="0" err="1"/>
+              <a:t>m.first_name</a:t>
+            </a:r>
+            <a:r>
+              <a:rPr lang="en-US" dirty="0"/>
+              <a:t>||' '||</a:t>
+            </a:r>
+            <a:r>
+              <a:rPr lang="en-US" dirty="0" err="1"/>
+              <a:t>m.last_name</a:t>
+            </a:r>
+            <a:r>
+              <a:rPr lang="en-US" dirty="0"/>
+              <a:t> man</a:t>
+            </a:r>
+          </a:p>
+          <a:p>
+            <a:r>
+              <a:rPr lang="en-US" dirty="0"/>
+              <a:t>from employees e</a:t>
+            </a:r>
+          </a:p>
+          <a:p>
+            <a:r>
+              <a:rPr lang="en-US" dirty="0"/>
+              <a:t>left join employees m on </a:t>
+            </a:r>
+            <a:r>
+              <a:rPr lang="en-US" dirty="0" err="1"/>
+              <a:t>m.employee_id</a:t>
+            </a:r>
+            <a:r>
+              <a:rPr lang="en-US" dirty="0"/>
+              <a:t>=</a:t>
+            </a:r>
+            <a:r>
+              <a:rPr lang="en-US" dirty="0" err="1"/>
+              <a:t>e.manager_id</a:t>
+            </a:r>
+            <a:endParaRPr lang="en-US" dirty="0"/>
+          </a:p>
+          <a:p>
+            <a:r>
+              <a:rPr lang="en-US" dirty="0"/>
+              <a:t>where </a:t>
+            </a:r>
+            <a:r>
+              <a:rPr lang="en-US" dirty="0" err="1"/>
+              <a:t>m.employee_id</a:t>
+            </a:r>
+            <a:r>
+              <a:rPr lang="en-US" dirty="0"/>
+              <a:t> is </a:t>
+            </a:r>
+            <a:r>
+              <a:rPr lang="en-US" dirty="0" smtClean="0"/>
+              <a:t>null</a:t>
+            </a:r>
+          </a:p>
+          <a:p>
+            <a:endParaRPr lang="en-US" dirty="0" smtClean="0"/>
+          </a:p>
+          <a:p>
+            <a:r>
+              <a:rPr lang="en-US" sz="5000" dirty="0" smtClean="0"/>
+              <a:t>Inner select</a:t>
+            </a:r>
+          </a:p>
+          <a:p>
+            <a:r>
+              <a:rPr lang="en-US" dirty="0" smtClean="0"/>
+              <a:t>select </a:t>
+            </a:r>
+            <a:r>
+              <a:rPr lang="en-US" dirty="0" err="1"/>
+              <a:t>e.first_name</a:t>
+            </a:r>
+            <a:r>
+              <a:rPr lang="en-US" dirty="0"/>
+              <a:t>||' '||</a:t>
+            </a:r>
+            <a:r>
+              <a:rPr lang="en-US" dirty="0" err="1"/>
+              <a:t>e.last_name</a:t>
+            </a:r>
+            <a:r>
+              <a:rPr lang="en-US" dirty="0"/>
+              <a:t> </a:t>
+            </a:r>
+            <a:r>
+              <a:rPr lang="en-US" dirty="0" err="1"/>
+              <a:t>emp</a:t>
+            </a:r>
+            <a:r>
+              <a:rPr lang="en-US" dirty="0"/>
+              <a:t>, </a:t>
+            </a:r>
+            <a:r>
+              <a:rPr lang="en-US" dirty="0" err="1"/>
+              <a:t>m.first_name</a:t>
+            </a:r>
+            <a:r>
+              <a:rPr lang="en-US" dirty="0"/>
+              <a:t>||' '||</a:t>
+            </a:r>
+            <a:r>
+              <a:rPr lang="en-US" dirty="0" err="1"/>
+              <a:t>m.last_name</a:t>
+            </a:r>
+            <a:r>
+              <a:rPr lang="en-US" dirty="0"/>
+              <a:t> man</a:t>
+            </a:r>
+          </a:p>
+          <a:p>
+            <a:r>
+              <a:rPr lang="en-US" dirty="0"/>
+              <a:t>from employees e, (select * from employees) m</a:t>
+            </a:r>
+          </a:p>
+          <a:p>
+            <a:r>
+              <a:rPr lang="en-US" dirty="0"/>
+              <a:t>where </a:t>
             </a:r>
             <a:r>
               <a:rPr lang="en-US" dirty="0" err="1" smtClean="0"/>
-              <a:t>m.employee_id</a:t>
+              <a:t>m.</a:t>
+            </a:r>
+            <a:r>
+              <a:rPr lang="en-US" u="sng" dirty="0" err="1" smtClean="0"/>
+              <a:t>employee_id</a:t>
             </a:r>
             <a:r>
               <a:rPr lang="en-US" dirty="0" smtClean="0"/>
@@ -5396,213 +5865,24 @@
             <a:endParaRPr lang="en-US" dirty="0" smtClean="0"/>
           </a:p>
           <a:p>
-            <a:endParaRPr lang="en-US" dirty="0" smtClean="0"/>
-          </a:p>
-          <a:p>
-            <a:r>
-              <a:rPr lang="en-US" sz="5000" dirty="0"/>
-              <a:t>l</a:t>
-            </a:r>
-            <a:r>
-              <a:rPr lang="en-US" sz="5000" dirty="0" smtClean="0"/>
-              <a:t>eft </a:t>
-            </a:r>
-            <a:r>
-              <a:rPr lang="en-US" sz="5000" dirty="0"/>
-              <a:t>join</a:t>
-            </a:r>
-            <a:br>
-              <a:rPr lang="en-US" sz="5000" dirty="0"/>
-            </a:br>
-            <a:r>
-              <a:rPr lang="en-US" dirty="0"/>
-              <a:t>select </a:t>
-            </a:r>
-            <a:r>
-              <a:rPr lang="en-US" dirty="0" err="1"/>
-              <a:t>e.first_name</a:t>
-            </a:r>
-            <a:r>
-              <a:rPr lang="en-US" dirty="0"/>
-              <a:t>||' '||</a:t>
-            </a:r>
-            <a:r>
-              <a:rPr lang="en-US" dirty="0" err="1"/>
-              <a:t>e.last_name</a:t>
-            </a:r>
-            <a:r>
-              <a:rPr lang="en-US" dirty="0"/>
+            <a:endParaRPr lang="en-US" dirty="0"/>
+          </a:p>
+          <a:p>
+            <a:r>
+              <a:rPr lang="en-US" sz="4500" dirty="0" smtClean="0"/>
+              <a:t>See</a:t>
+            </a:r>
+            <a:r>
+              <a:rPr lang="en-US" sz="4400" dirty="0" smtClean="0"/>
               <a:t> </a:t>
             </a:r>
             <a:r>
-              <a:rPr lang="en-US" dirty="0" err="1"/>
-              <a:t>emp</a:t>
-            </a:r>
-            <a:r>
-              <a:rPr lang="en-US" dirty="0"/>
-              <a:t>, </a:t>
-            </a:r>
-            <a:r>
-              <a:rPr lang="en-US" dirty="0" err="1"/>
-              <a:t>m.first_name</a:t>
-            </a:r>
-            <a:r>
-              <a:rPr lang="en-US" dirty="0"/>
-              <a:t>||' '||</a:t>
-            </a:r>
-            <a:r>
-              <a:rPr lang="en-US" dirty="0" err="1"/>
-              <a:t>m.last_name</a:t>
-            </a:r>
-            <a:r>
-              <a:rPr lang="en-US" dirty="0"/>
-              <a:t> man</a:t>
-            </a:r>
-            <a:br>
-              <a:rPr lang="en-US" dirty="0"/>
-            </a:br>
-            <a:r>
-              <a:rPr lang="en-US" dirty="0"/>
-              <a:t>from employees e </a:t>
-            </a:r>
-            <a:br>
-              <a:rPr lang="en-US" dirty="0"/>
-            </a:br>
-            <a:r>
-              <a:rPr lang="en-US" b="1" dirty="0" smtClean="0"/>
-              <a:t>left join </a:t>
-            </a:r>
-            <a:r>
-              <a:rPr lang="en-US" dirty="0"/>
-              <a:t>employees m on </a:t>
-            </a:r>
-            <a:r>
-              <a:rPr lang="en-US" dirty="0" err="1" smtClean="0"/>
-              <a:t>m.employee_id</a:t>
-            </a:r>
-            <a:r>
-              <a:rPr lang="en-US" dirty="0" smtClean="0"/>
-              <a:t>=</a:t>
-            </a:r>
-            <a:r>
-              <a:rPr lang="en-US" dirty="0" err="1" smtClean="0"/>
-              <a:t>e.manager_id</a:t>
-            </a:r>
-            <a:endParaRPr lang="en-US" dirty="0" smtClean="0"/>
-          </a:p>
-          <a:p>
-            <a:endParaRPr lang="en-US" dirty="0" smtClean="0"/>
-          </a:p>
-          <a:p>
-            <a:r>
-              <a:rPr lang="en-US" sz="5000" dirty="0" smtClean="0"/>
-              <a:t>Inner </a:t>
-            </a:r>
-            <a:r>
-              <a:rPr lang="en-US" sz="5000" dirty="0"/>
-              <a:t>select</a:t>
-            </a:r>
-            <a:br>
-              <a:rPr lang="en-US" sz="5000" dirty="0"/>
-            </a:br>
-            <a:r>
-              <a:rPr lang="en-US" sz="3300" dirty="0" err="1"/>
-              <a:t>select</a:t>
-            </a:r>
-            <a:r>
-              <a:rPr lang="en-US" sz="3300" dirty="0"/>
-              <a:t> </a:t>
-            </a:r>
-            <a:r>
-              <a:rPr lang="en-US" sz="3300" dirty="0" err="1"/>
-              <a:t>e.first_name</a:t>
-            </a:r>
-            <a:r>
-              <a:rPr lang="en-US" sz="3300" dirty="0"/>
-              <a:t>||' '||</a:t>
-            </a:r>
-            <a:r>
-              <a:rPr lang="en-US" sz="3300" dirty="0" err="1"/>
-              <a:t>e.last_name</a:t>
-            </a:r>
-            <a:r>
-              <a:rPr lang="en-US" sz="3300" dirty="0"/>
-              <a:t> </a:t>
-            </a:r>
-            <a:r>
-              <a:rPr lang="en-US" sz="3300" dirty="0" err="1"/>
-              <a:t>emp</a:t>
-            </a:r>
-            <a:r>
-              <a:rPr lang="en-US" sz="3300" dirty="0"/>
-              <a:t>, </a:t>
-            </a:r>
-            <a:r>
-              <a:rPr lang="en-US" sz="3300" dirty="0" err="1"/>
-              <a:t>m.first_name</a:t>
-            </a:r>
-            <a:r>
-              <a:rPr lang="en-US" sz="3300" dirty="0"/>
-              <a:t>||' '||</a:t>
-            </a:r>
-            <a:r>
-              <a:rPr lang="en-US" sz="3300" dirty="0" err="1"/>
-              <a:t>m.last_name</a:t>
-            </a:r>
-            <a:r>
-              <a:rPr lang="en-US" sz="3300" dirty="0"/>
-              <a:t> man</a:t>
-            </a:r>
-            <a:br>
-              <a:rPr lang="en-US" sz="3300" dirty="0"/>
-            </a:br>
-            <a:r>
-              <a:rPr lang="en-US" sz="3300" dirty="0"/>
-              <a:t>from employees e,</a:t>
-            </a:r>
-            <a:br>
-              <a:rPr lang="en-US" sz="3300" dirty="0"/>
-            </a:br>
-            <a:r>
-              <a:rPr lang="en-US" sz="3300" b="1" dirty="0"/>
-              <a:t>(select * from employees) m</a:t>
-            </a:r>
-            <a:br>
-              <a:rPr lang="en-US" sz="3300" b="1" dirty="0"/>
-            </a:br>
-            <a:r>
-              <a:rPr lang="en-US" sz="3300" dirty="0"/>
-              <a:t>where </a:t>
-            </a:r>
-            <a:r>
-              <a:rPr lang="en-US" sz="3300" dirty="0" err="1"/>
-              <a:t>m.employee_id</a:t>
-            </a:r>
-            <a:r>
-              <a:rPr lang="en-US" sz="3300" dirty="0"/>
-              <a:t>=</a:t>
-            </a:r>
-            <a:r>
-              <a:rPr lang="en-US" sz="3300" dirty="0" err="1"/>
-              <a:t>e.manager_id</a:t>
-            </a:r>
-            <a:endParaRPr lang="en-US" sz="3300" dirty="0"/>
-          </a:p>
-          <a:p>
-            <a:endParaRPr lang="en-US" sz="3800" dirty="0"/>
-          </a:p>
-          <a:p>
-            <a:r>
-              <a:rPr lang="en-US" sz="4500" dirty="0" smtClean="0"/>
-              <a:t>See </a:t>
-            </a:r>
-            <a:r>
-              <a:rPr lang="en-US" sz="4500" dirty="0">
+              <a:rPr lang="en-US" sz="4400" dirty="0">
                 <a:hlinkClick r:id="rId3"/>
               </a:rPr>
-              <a:t>http://en.wikipedia.org/wiki/Join_(SQL)</a:t>
-            </a:r>
-            <a:endParaRPr lang="en-US" sz="4500" dirty="0" smtClean="0"/>
+              <a:t>wikipedia.org/wiki/Join_(SQL)</a:t>
+            </a:r>
+            <a:endParaRPr lang="en-US" sz="4400" dirty="0" smtClean="0"/>
           </a:p>
         </p:txBody>
       </p:sp>
@@ -5653,7 +5933,11 @@
           <a:p>
             <a:r>
               <a:rPr lang="en-US" dirty="0" smtClean="0"/>
-              <a:t>Using Union</a:t>
+              <a:t>Using </a:t>
+            </a:r>
+            <a:r>
+              <a:rPr lang="en-US" dirty="0" smtClean="0"/>
+              <a:t>Union (all)</a:t>
             </a:r>
             <a:endParaRPr lang="en-US" dirty="0"/>
           </a:p>
@@ -5678,17 +5962,12 @@
           <a:p>
             <a:r>
               <a:rPr lang="en-US" dirty="0" smtClean="0"/>
-              <a:t>Union </a:t>
-            </a:r>
-            <a:r>
-              <a:rPr lang="en-US" dirty="0"/>
-              <a:t>all</a:t>
-            </a:r>
-            <a:br>
-              <a:rPr lang="en-US" dirty="0"/>
-            </a:br>
-            <a:r>
-              <a:rPr lang="en-US" sz="2000" dirty="0"/>
+              <a:t>Union and Union all</a:t>
+            </a:r>
+          </a:p>
+          <a:p>
+            <a:r>
+              <a:rPr lang="en-US" sz="2000" dirty="0" smtClean="0"/>
               <a:t>select </a:t>
             </a:r>
             <a:r>
@@ -5716,97 +5995,6 @@
               <a:t> from employees e where </a:t>
             </a:r>
             <a:r>
-              <a:rPr lang="en-US" sz="2000" dirty="0" err="1" smtClean="0"/>
-              <a:t>e.salary</a:t>
-            </a:r>
-            <a:r>
-              <a:rPr lang="en-US" sz="2000" dirty="0" smtClean="0"/>
-              <a:t>&gt;10000</a:t>
-            </a:r>
-            <a:br>
-              <a:rPr lang="en-US" sz="2000" dirty="0" smtClean="0"/>
-            </a:br>
-            <a:r>
-              <a:rPr lang="en-US" sz="2000" b="1" dirty="0" smtClean="0"/>
-              <a:t>union all</a:t>
-            </a:r>
-            <a:br>
-              <a:rPr lang="en-US" sz="2000" b="1" dirty="0" smtClean="0"/>
-            </a:br>
-            <a:r>
-              <a:rPr lang="en-US" sz="2000" dirty="0" smtClean="0"/>
-              <a:t>select </a:t>
-            </a:r>
-            <a:r>
-              <a:rPr lang="en-US" sz="2000" dirty="0" err="1"/>
-              <a:t>e.first_name</a:t>
-            </a:r>
-            <a:r>
-              <a:rPr lang="en-US" sz="2000" dirty="0"/>
-              <a:t>||' '||</a:t>
-            </a:r>
-            <a:r>
-              <a:rPr lang="en-US" sz="2000" dirty="0" err="1"/>
-              <a:t>e.last_name</a:t>
-            </a:r>
-            <a:r>
-              <a:rPr lang="en-US" sz="2000" dirty="0"/>
-              <a:t> </a:t>
-            </a:r>
-            <a:r>
-              <a:rPr lang="en-US" sz="2000" dirty="0" err="1"/>
-              <a:t>emp</a:t>
-            </a:r>
-            <a:r>
-              <a:rPr lang="en-US" sz="2000" dirty="0"/>
-              <a:t> from employees e where </a:t>
-            </a:r>
-            <a:r>
-              <a:rPr lang="en-US" sz="2000" dirty="0" err="1"/>
-              <a:t>e.manager_id</a:t>
-            </a:r>
-            <a:r>
-              <a:rPr lang="en-US" sz="2000" dirty="0"/>
-              <a:t>=100</a:t>
-            </a:r>
-          </a:p>
-          <a:p>
-            <a:r>
-              <a:rPr lang="en-US" dirty="0" smtClean="0"/>
-              <a:t>Union</a:t>
-            </a:r>
-            <a:br>
-              <a:rPr lang="en-US" dirty="0" smtClean="0"/>
-            </a:br>
-            <a:r>
-              <a:rPr lang="en-US" sz="2000" dirty="0"/>
-              <a:t>select </a:t>
-            </a:r>
-            <a:r>
-              <a:rPr lang="en-US" sz="2000" dirty="0" err="1"/>
-              <a:t>e.first_name</a:t>
-            </a:r>
-            <a:r>
-              <a:rPr lang="en-US" sz="2000" dirty="0"/>
-              <a:t>||' '||</a:t>
-            </a:r>
-            <a:r>
-              <a:rPr lang="en-US" sz="2000" dirty="0" err="1"/>
-              <a:t>e.last_name</a:t>
-            </a:r>
-            <a:r>
-              <a:rPr lang="en-US" sz="2000" dirty="0"/>
-              <a:t> </a:t>
-            </a:r>
-            <a:r>
-              <a:rPr lang="en-US" sz="2000" dirty="0" err="1"/>
-              <a:t>emp</a:t>
-            </a:r>
-            <a:r>
-              <a:rPr lang="en-US" sz="2000" dirty="0"/>
-              <a:t> from employees e where </a:t>
-            </a:r>
-            <a:r>
               <a:rPr lang="en-US" sz="2000" dirty="0" err="1"/>
               <a:t>e.salary</a:t>
             </a:r>
@@ -5814,20 +6002,14 @@
               <a:rPr lang="en-US" sz="2000" dirty="0"/>
               <a:t>&gt;10000</a:t>
             </a:r>
-            <a:br>
+          </a:p>
+          <a:p>
+            <a:r>
               <a:rPr lang="en-US" sz="2000" dirty="0"/>
-            </a:br>
-            <a:r>
-              <a:rPr lang="en-US" sz="2000" b="1" dirty="0" smtClean="0"/>
-              <a:t>union</a:t>
-            </a:r>
-            <a:r>
-              <a:rPr lang="en-US" sz="2000" dirty="0"/>
-              <a:t/>
-            </a:r>
-            <a:br>
-              <a:rPr lang="en-US" sz="2000" dirty="0"/>
-            </a:br>
+              <a:t>union all</a:t>
+            </a:r>
+          </a:p>
+          <a:p>
             <a:r>
               <a:rPr lang="en-US" sz="2000" dirty="0"/>
               <a:t>select </a:t>
@@ -6147,59 +6329,32 @@
           <a:p>
             <a:r>
               <a:rPr lang="en-US" dirty="0" smtClean="0"/>
-              <a:t>Install </a:t>
-            </a:r>
-            <a:r>
-              <a:rPr lang="en-US" dirty="0" smtClean="0"/>
-              <a:t>database</a:t>
-            </a:r>
-            <a:endParaRPr lang="en-US" dirty="0" smtClean="0"/>
-          </a:p>
-          <a:p>
-            <a:r>
-              <a:rPr lang="en-US" dirty="0" smtClean="0"/>
-              <a:t>Install </a:t>
-            </a:r>
-            <a:r>
-              <a:rPr lang="en-US" dirty="0" smtClean="0"/>
-              <a:t>database view software</a:t>
-            </a:r>
-            <a:endParaRPr lang="en-US" dirty="0" smtClean="0"/>
+              <a:t>Install database</a:t>
+            </a:r>
+          </a:p>
+          <a:p>
+            <a:r>
+              <a:rPr lang="en-US" dirty="0" smtClean="0"/>
+              <a:t>Install database view software</a:t>
+            </a:r>
           </a:p>
           <a:p>
             <a:r>
               <a:rPr lang="en-US" dirty="0" smtClean="0"/>
               <a:t>Connect to database using this software</a:t>
             </a:r>
-            <a:endParaRPr lang="en-US" dirty="0" smtClean="0"/>
-          </a:p>
-          <a:p>
-            <a:r>
-              <a:rPr lang="en-US" dirty="0" smtClean="0"/>
-              <a:t>Make </a:t>
-            </a:r>
-            <a:r>
-              <a:rPr lang="en-US" dirty="0" smtClean="0"/>
-              <a:t>SQL </a:t>
-            </a:r>
-            <a:r>
-              <a:rPr lang="en-US" dirty="0" smtClean="0"/>
-              <a:t>script to</a:t>
+          </a:p>
+          <a:p>
+            <a:r>
+              <a:rPr lang="en-US" dirty="0" smtClean="0"/>
+              <a:t>Make SQL script to</a:t>
             </a:r>
           </a:p>
           <a:p>
             <a:pPr lvl="1"/>
             <a:r>
               <a:rPr lang="en-US" dirty="0" smtClean="0"/>
-              <a:t>Add all </a:t>
-            </a:r>
-            <a:r>
-              <a:rPr lang="en-US" dirty="0" smtClean="0"/>
-              <a:t>existing </a:t>
-            </a:r>
-            <a:r>
-              <a:rPr lang="en-US" dirty="0" smtClean="0"/>
-              <a:t>countries (~190)</a:t>
+              <a:t>Add all existing countries (~190)</a:t>
             </a:r>
           </a:p>
           <a:p>
@@ -6311,16 +6466,55 @@
           </a:bodyPr>
           <a:lstStyle/>
           <a:p>
-            <a:endParaRPr lang="en-US" smtClean="0">
-              <a:hlinkClick r:id="rId3"/>
-            </a:endParaRPr>
-          </a:p>
-          <a:p>
             <a:r>
               <a:rPr lang="en-US" dirty="0" smtClean="0">
                 <a:hlinkClick r:id="rId3"/>
               </a:rPr>
+              <a:t>github.com/</a:t>
+            </a:r>
+            <a:r>
+              <a:rPr lang="en-US" dirty="0" err="1" smtClean="0">
+                <a:hlinkClick r:id="rId3"/>
+              </a:rPr>
+              <a:t>vmorev</a:t>
+            </a:r>
+            <a:r>
+              <a:rPr lang="en-US" dirty="0" smtClean="0">
+                <a:hlinkClick r:id="rId3"/>
+              </a:rPr>
+              <a:t>/</a:t>
+            </a:r>
+            <a:r>
+              <a:rPr lang="en-US" dirty="0" err="1" smtClean="0">
+                <a:hlinkClick r:id="rId3"/>
+              </a:rPr>
+              <a:t>SQL_lectures</a:t>
+            </a:r>
+            <a:endParaRPr lang="en-US" dirty="0" smtClean="0">
+              <a:hlinkClick r:id="rId4"/>
+            </a:endParaRPr>
+          </a:p>
+          <a:p>
+            <a:r>
+              <a:rPr lang="en-US" dirty="0" smtClean="0">
+                <a:hlinkClick r:id="rId4"/>
+              </a:rPr>
               <a:t>wikipedia.org/wiki/SQL-92</a:t>
+            </a:r>
+            <a:endParaRPr lang="en-US" dirty="0" smtClean="0"/>
+          </a:p>
+          <a:p>
+            <a:r>
+              <a:rPr lang="en-US" dirty="0" smtClean="0">
+                <a:hlinkClick r:id="rId5"/>
+              </a:rPr>
+              <a:t>wikipedia.org/wiki/Join</a:t>
+            </a:r>
+            <a:r>
+              <a:rPr lang="en-US" dirty="0">
+                <a:hlinkClick r:id="rId5"/>
+              </a:rPr>
+              <a:t>_(SQL)</a:t>
             </a:r>
             <a:endParaRPr lang="en-US" dirty="0"/>
           </a:p>
@@ -6435,16 +6629,11 @@
               <a:rPr lang="en-US" sz="2400" dirty="0" smtClean="0"/>
               <a:t>Other well known files</a:t>
             </a:r>
-            <a:endParaRPr lang="en-US" sz="2400" dirty="0" smtClean="0"/>
-          </a:p>
-          <a:p>
-            <a:r>
-              <a:rPr lang="en-US" dirty="0" smtClean="0"/>
-              <a:t>Special </a:t>
-            </a:r>
-            <a:r>
-              <a:rPr lang="en-US" dirty="0" smtClean="0"/>
-              <a:t>software</a:t>
+          </a:p>
+          <a:p>
+            <a:r>
+              <a:rPr lang="en-US" dirty="0" smtClean="0"/>
+              <a:t>Special software</a:t>
             </a:r>
           </a:p>
           <a:p>
@@ -6474,7 +6663,6 @@
               <a:rPr lang="en-US" dirty="0" smtClean="0"/>
               <a:t>Custom formats</a:t>
             </a:r>
-            <a:endParaRPr lang="en-US" dirty="0" smtClean="0"/>
           </a:p>
         </p:txBody>
       </p:sp>
@@ -7004,15 +7192,7 @@
           <a:p>
             <a:r>
               <a:rPr lang="en-US" sz="2800" dirty="0" smtClean="0"/>
-              <a:t>DML only! </a:t>
-            </a:r>
-            <a:r>
-              <a:rPr lang="en-US" sz="2800" dirty="0" smtClean="0"/>
-              <a:t>Means…you can’t </a:t>
-            </a:r>
-            <a:r>
-              <a:rPr lang="en-US" sz="2800" dirty="0" smtClean="0"/>
-              <a:t>rollback table creation</a:t>
+              <a:t>DML only! Means…you can’t rollback table creation</a:t>
             </a:r>
             <a:endParaRPr lang="en-US" sz="2800" dirty="0"/>
           </a:p>

</xml_diff>